<commit_message>
Color and label tweaks. Powerpoint updated
</commit_message>
<xml_diff>
--- a/Newbie’s Thought on React Native.pptx
+++ b/Newbie’s Thought on React Native.pptx
@@ -6,14 +6,15 @@
   </p:sldMasterIdLst>
   <p:sldIdLst>
     <p:sldId id="256" r:id="rId2"/>
-    <p:sldId id="257" r:id="rId3"/>
-    <p:sldId id="258" r:id="rId4"/>
-    <p:sldId id="261" r:id="rId5"/>
-    <p:sldId id="262" r:id="rId6"/>
-    <p:sldId id="263" r:id="rId7"/>
-    <p:sldId id="259" r:id="rId8"/>
-    <p:sldId id="260" r:id="rId9"/>
-    <p:sldId id="264" r:id="rId10"/>
+    <p:sldId id="265" r:id="rId3"/>
+    <p:sldId id="257" r:id="rId4"/>
+    <p:sldId id="258" r:id="rId5"/>
+    <p:sldId id="261" r:id="rId6"/>
+    <p:sldId id="262" r:id="rId7"/>
+    <p:sldId id="263" r:id="rId8"/>
+    <p:sldId id="259" r:id="rId9"/>
+    <p:sldId id="260" r:id="rId10"/>
+    <p:sldId id="264" r:id="rId11"/>
   </p:sldIdLst>
   <p:sldSz cx="12192000" cy="6858000"/>
   <p:notesSz cx="6858000" cy="9144000"/>
@@ -112,6 +113,11 @@
       </a:defRPr>
     </a:lvl9pPr>
   </p:defaultTextStyle>
+  <p:extLst>
+    <p:ext uri="{EFAFB233-063F-42B5-8137-9DF3F51BA10A}">
+      <p15:sldGuideLst xmlns:p15="http://schemas.microsoft.com/office/powerpoint/2012/main"/>
+    </p:ext>
+  </p:extLst>
 </p:presentation>
 </file>
 
@@ -13261,6 +13267,134 @@
 </p:sld>
 </file>
 
+<file path=ppt/slides/slide10.xml><?xml version="1.0" encoding="utf-8"?>
+<p:sld xmlns:a="http://schemas.openxmlformats.org/drawingml/2006/main" xmlns:r="http://schemas.openxmlformats.org/officeDocument/2006/relationships" xmlns:p="http://schemas.openxmlformats.org/presentationml/2006/main">
+  <p:cSld>
+    <p:spTree>
+      <p:nvGrpSpPr>
+        <p:cNvPr id="1" name=""/>
+        <p:cNvGrpSpPr/>
+        <p:nvPr/>
+      </p:nvGrpSpPr>
+      <p:grpSpPr>
+        <a:xfrm>
+          <a:off x="0" y="0"/>
+          <a:ext cx="0" cy="0"/>
+          <a:chOff x="0" y="0"/>
+          <a:chExt cx="0" cy="0"/>
+        </a:xfrm>
+      </p:grpSpPr>
+      <p:sp>
+        <p:nvSpPr>
+          <p:cNvPr id="2" name="Title 1">
+            <a:extLst>
+              <a:ext uri="{FF2B5EF4-FFF2-40B4-BE49-F238E27FC236}">
+                <a16:creationId xmlns:a16="http://schemas.microsoft.com/office/drawing/2014/main" id="{8FA47781-981F-42FF-9E50-0D39610A5F7A}"/>
+              </a:ext>
+            </a:extLst>
+          </p:cNvPr>
+          <p:cNvSpPr>
+            <a:spLocks noGrp="1"/>
+          </p:cNvSpPr>
+          <p:nvPr>
+            <p:ph type="ctrTitle"/>
+          </p:nvPr>
+        </p:nvSpPr>
+        <p:spPr>
+          <a:xfrm>
+            <a:off x="1154954" y="2169364"/>
+            <a:ext cx="9248003" cy="971402"/>
+          </a:xfrm>
+        </p:spPr>
+        <p:txBody>
+          <a:bodyPr/>
+          <a:lstStyle/>
+          <a:p>
+            <a:r>
+              <a:rPr lang="en-US" dirty="0"/>
+              <a:t>Questions/Comments?</a:t>
+            </a:r>
+            <a:br>
+              <a:rPr lang="en-US" dirty="0"/>
+            </a:br>
+            <a:br>
+              <a:rPr lang="en-US" dirty="0"/>
+            </a:br>
+            <a:r>
+              <a:rPr lang="en-US" dirty="0"/>
+              <a:t>contact info</a:t>
+            </a:r>
+          </a:p>
+        </p:txBody>
+      </p:sp>
+      <p:sp>
+        <p:nvSpPr>
+          <p:cNvPr id="4" name="Subtitle 3">
+            <a:extLst>
+              <a:ext uri="{FF2B5EF4-FFF2-40B4-BE49-F238E27FC236}">
+                <a16:creationId xmlns:a16="http://schemas.microsoft.com/office/drawing/2014/main" id="{F3E837E5-DA39-4532-958A-18A5C8CDD8D5}"/>
+              </a:ext>
+            </a:extLst>
+          </p:cNvPr>
+          <p:cNvSpPr>
+            <a:spLocks noGrp="1"/>
+          </p:cNvSpPr>
+          <p:nvPr>
+            <p:ph type="subTitle" idx="1"/>
+          </p:nvPr>
+        </p:nvSpPr>
+        <p:spPr>
+          <a:xfrm>
+            <a:off x="1154954" y="3260035"/>
+            <a:ext cx="8825658" cy="2345634"/>
+          </a:xfrm>
+        </p:spPr>
+        <p:txBody>
+          <a:bodyPr>
+            <a:normAutofit/>
+          </a:bodyPr>
+          <a:lstStyle/>
+          <a:p>
+            <a:r>
+              <a:rPr lang="en-US" sz="2800" dirty="0"/>
+              <a:t>Jasonbrunelle.com</a:t>
+            </a:r>
+          </a:p>
+          <a:p>
+            <a:r>
+              <a:rPr lang="en-US" sz="2800" dirty="0"/>
+              <a:t>  GitHub/</a:t>
+            </a:r>
+            <a:r>
+              <a:rPr lang="en-US" sz="2800" dirty="0" err="1"/>
+              <a:t>LinkedIN</a:t>
+            </a:r>
+            <a:endParaRPr lang="en-US" sz="2800" dirty="0"/>
+          </a:p>
+          <a:p>
+            <a:endParaRPr lang="en-US" sz="2800" dirty="0"/>
+          </a:p>
+          <a:p>
+            <a:r>
+              <a:rPr lang="en-US" sz="2800" dirty="0"/>
+              <a:t>jason@jasonbrunelle.com</a:t>
+            </a:r>
+          </a:p>
+        </p:txBody>
+      </p:sp>
+    </p:spTree>
+    <p:extLst>
+      <p:ext uri="{BB962C8B-B14F-4D97-AF65-F5344CB8AC3E}">
+        <p14:creationId xmlns:p14="http://schemas.microsoft.com/office/powerpoint/2010/main" val="2916672321"/>
+      </p:ext>
+    </p:extLst>
+  </p:cSld>
+  <p:clrMapOvr>
+    <a:masterClrMapping/>
+  </p:clrMapOvr>
+</p:sld>
+</file>
+
 <file path=ppt/slides/slide2.xml><?xml version="1.0" encoding="utf-8"?>
 <p:sld xmlns:a="http://schemas.openxmlformats.org/drawingml/2006/main" xmlns:r="http://schemas.openxmlformats.org/officeDocument/2006/relationships" xmlns:p="http://schemas.openxmlformats.org/presentationml/2006/main">
   <p:cSld>
@@ -13296,8 +13430,8 @@
         </p:nvSpPr>
         <p:spPr>
           <a:xfrm>
-            <a:off x="1154955" y="751381"/>
-            <a:ext cx="8825658" cy="971402"/>
+            <a:off x="1154955" y="1258960"/>
+            <a:ext cx="8825658" cy="4412973"/>
           </a:xfrm>
         </p:spPr>
         <p:txBody>
@@ -13306,80 +13440,17 @@
           <a:p>
             <a:r>
               <a:rPr lang="en-US" dirty="0"/>
-              <a:t>Existing apps</a:t>
+              <a:t>What are your backgrounds?</a:t>
             </a:r>
-          </a:p>
-        </p:txBody>
-      </p:sp>
-      <p:sp>
-        <p:nvSpPr>
-          <p:cNvPr id="4" name="Subtitle 3">
-            <a:extLst>
-              <a:ext uri="{FF2B5EF4-FFF2-40B4-BE49-F238E27FC236}">
-                <a16:creationId xmlns:a16="http://schemas.microsoft.com/office/drawing/2014/main" id="{F3E837E5-DA39-4532-958A-18A5C8CDD8D5}"/>
-              </a:ext>
-            </a:extLst>
-          </p:cNvPr>
-          <p:cNvSpPr>
-            <a:spLocks noGrp="1"/>
-          </p:cNvSpPr>
-          <p:nvPr>
-            <p:ph type="subTitle" idx="1"/>
-          </p:nvPr>
-        </p:nvSpPr>
-        <p:spPr>
-          <a:xfrm>
-            <a:off x="1154955" y="1722783"/>
-            <a:ext cx="8825658" cy="3916017"/>
-          </a:xfrm>
-        </p:spPr>
-        <p:txBody>
-          <a:bodyPr>
-            <a:normAutofit/>
-          </a:bodyPr>
-          <a:lstStyle/>
-          <a:p>
-            <a:pPr marL="285750" indent="-285750">
-              <a:buFont typeface="Arial" panose="020B0604020202020204" pitchFamily="34" charset="0"/>
-              <a:buChar char="•"/>
-            </a:pPr>
+            <a:br>
+              <a:rPr lang="en-US" dirty="0"/>
+            </a:br>
+            <a:br>
+              <a:rPr lang="en-US" dirty="0"/>
+            </a:br>
             <a:r>
-              <a:rPr lang="en-US" sz="2800" dirty="0">
-                <a:hlinkClick r:id="rId2"/>
-              </a:rPr>
-              <a:t>https://www.pcmag.com/roundup/300318/the-best-password-managers</a:t>
-            </a:r>
-            <a:endParaRPr lang="en-US" sz="2800" dirty="0"/>
-          </a:p>
-          <a:p>
-            <a:pPr marL="285750" indent="-285750">
-              <a:buFont typeface="Arial" panose="020B0604020202020204" pitchFamily="34" charset="0"/>
-              <a:buChar char="•"/>
-            </a:pPr>
-            <a:r>
-              <a:rPr lang="en-US" sz="2800" dirty="0"/>
-              <a:t>Norton password manager (Identity safe)</a:t>
-            </a:r>
-            <a:endParaRPr lang="en-US" sz="2600" dirty="0"/>
-          </a:p>
-          <a:p>
-            <a:pPr marL="742950" lvl="1" indent="-285750">
-              <a:buFont typeface="Arial" panose="020B0604020202020204" pitchFamily="34" charset="0"/>
-              <a:buChar char="•"/>
-            </a:pPr>
-            <a:r>
-              <a:rPr lang="en-US" sz="2600" dirty="0"/>
-              <a:t>Sometimes login is slow</a:t>
-            </a:r>
-          </a:p>
-          <a:p>
-            <a:pPr marL="742950" lvl="1" indent="-285750">
-              <a:buFont typeface="Arial" panose="020B0604020202020204" pitchFamily="34" charset="0"/>
-              <a:buChar char="•"/>
-            </a:pPr>
-            <a:r>
-              <a:rPr lang="en-US" sz="2600" dirty="0"/>
-              <a:t>Insecure – resuming app doesn’t require reauthentication</a:t>
+              <a:rPr lang="en-US" dirty="0"/>
+              <a:t>React/React Native Experience Levels?</a:t>
             </a:r>
           </a:p>
         </p:txBody>
@@ -13387,7 +13458,7 @@
     </p:spTree>
     <p:extLst>
       <p:ext uri="{BB962C8B-B14F-4D97-AF65-F5344CB8AC3E}">
-        <p14:creationId xmlns:p14="http://schemas.microsoft.com/office/powerpoint/2010/main" val="1922776887"/>
+        <p14:creationId xmlns:p14="http://schemas.microsoft.com/office/powerpoint/2010/main" val="3175011094"/>
       </p:ext>
     </p:extLst>
   </p:cSld>
@@ -13442,7 +13513,7 @@
           <a:p>
             <a:r>
               <a:rPr lang="en-US" dirty="0"/>
-              <a:t>Goals</a:t>
+              <a:t>Existing apps</a:t>
             </a:r>
           </a:p>
         </p:txBody>
@@ -13480,9 +13551,12 @@
               <a:buChar char="•"/>
             </a:pPr>
             <a:r>
-              <a:rPr lang="en-US" sz="2800" dirty="0"/>
-              <a:t>Store login information on local device</a:t>
+              <a:rPr lang="en-US" sz="2800" dirty="0">
+                <a:hlinkClick r:id="rId2"/>
+              </a:rPr>
+              <a:t>https://www.pcmag.com/roundup/300318/the-best-password-managers</a:t>
             </a:r>
+            <a:endParaRPr lang="en-US" sz="2800" dirty="0"/>
           </a:p>
           <a:p>
             <a:pPr marL="285750" indent="-285750">
@@ -13491,37 +13565,28 @@
             </a:pPr>
             <a:r>
               <a:rPr lang="en-US" sz="2800" dirty="0"/>
-              <a:t>Retrieve login information from local device</a:t>
+              <a:t>Norton password manager (Identity safe)</a:t>
             </a:r>
-          </a:p>
-          <a:p>
-            <a:pPr marL="285750" indent="-285750">
+            <a:endParaRPr lang="en-US" sz="2600" dirty="0"/>
+          </a:p>
+          <a:p>
+            <a:pPr marL="742950" lvl="1" indent="-285750">
               <a:buFont typeface="Arial" panose="020B0604020202020204" pitchFamily="34" charset="0"/>
               <a:buChar char="•"/>
             </a:pPr>
             <a:r>
-              <a:rPr lang="en-US" sz="2800" dirty="0"/>
-              <a:t>Sync to offsite storage</a:t>
+              <a:rPr lang="en-US" sz="2600" dirty="0"/>
+              <a:t>Sometimes login is slow</a:t>
             </a:r>
           </a:p>
           <a:p>
-            <a:pPr marL="285750" indent="-285750">
+            <a:pPr marL="742950" lvl="1" indent="-285750">
               <a:buFont typeface="Arial" panose="020B0604020202020204" pitchFamily="34" charset="0"/>
               <a:buChar char="•"/>
             </a:pPr>
             <a:r>
-              <a:rPr lang="en-US" sz="2800" dirty="0"/>
-              <a:t>Require re-authentication when app resumes</a:t>
-            </a:r>
-          </a:p>
-          <a:p>
-            <a:pPr marL="285750" indent="-285750">
-              <a:buFont typeface="Arial" panose="020B0604020202020204" pitchFamily="34" charset="0"/>
-              <a:buChar char="•"/>
-            </a:pPr>
-            <a:r>
-              <a:rPr lang="en-US" sz="2800" dirty="0"/>
-              <a:t>Auto-generate password</a:t>
+              <a:rPr lang="en-US" sz="2600" dirty="0"/>
+              <a:t>Insecure – resuming app doesn’t require reauthentication</a:t>
             </a:r>
           </a:p>
         </p:txBody>
@@ -13529,7 +13594,7 @@
     </p:spTree>
     <p:extLst>
       <p:ext uri="{BB962C8B-B14F-4D97-AF65-F5344CB8AC3E}">
-        <p14:creationId xmlns:p14="http://schemas.microsoft.com/office/powerpoint/2010/main" val="1367992137"/>
+        <p14:creationId xmlns:p14="http://schemas.microsoft.com/office/powerpoint/2010/main" val="1922776887"/>
       </p:ext>
     </p:extLst>
   </p:cSld>
@@ -13584,7 +13649,7 @@
           <a:p>
             <a:r>
               <a:rPr lang="en-US" dirty="0"/>
-              <a:t>Apple/IOS</a:t>
+              <a:t>Goals</a:t>
             </a:r>
           </a:p>
         </p:txBody>
@@ -13617,23 +13682,53 @@
           </a:bodyPr>
           <a:lstStyle/>
           <a:p>
-            <a:pPr marL="457200" indent="-457200">
+            <a:pPr marL="285750" indent="-285750">
               <a:buFont typeface="Arial" panose="020B0604020202020204" pitchFamily="34" charset="0"/>
               <a:buChar char="•"/>
             </a:pPr>
             <a:r>
               <a:rPr lang="en-US" sz="2800" dirty="0"/>
-              <a:t>I don’t own a mac or an IOS device, so never tested this on IOS</a:t>
+              <a:t>Store login information on local device</a:t>
             </a:r>
           </a:p>
           <a:p>
-            <a:pPr marL="457200" indent="-457200">
+            <a:pPr marL="285750" indent="-285750">
               <a:buFont typeface="Arial" panose="020B0604020202020204" pitchFamily="34" charset="0"/>
               <a:buChar char="•"/>
             </a:pPr>
             <a:r>
               <a:rPr lang="en-US" sz="2800" dirty="0"/>
-              <a:t>Macincloud.com for testing?</a:t>
+              <a:t>Retrieve login information from local device</a:t>
+            </a:r>
+          </a:p>
+          <a:p>
+            <a:pPr marL="285750" indent="-285750">
+              <a:buFont typeface="Arial" panose="020B0604020202020204" pitchFamily="34" charset="0"/>
+              <a:buChar char="•"/>
+            </a:pPr>
+            <a:r>
+              <a:rPr lang="en-US" sz="2800" dirty="0"/>
+              <a:t>Sync to offsite storage</a:t>
+            </a:r>
+          </a:p>
+          <a:p>
+            <a:pPr marL="285750" indent="-285750">
+              <a:buFont typeface="Arial" panose="020B0604020202020204" pitchFamily="34" charset="0"/>
+              <a:buChar char="•"/>
+            </a:pPr>
+            <a:r>
+              <a:rPr lang="en-US" sz="2800" dirty="0"/>
+              <a:t>Require re-authentication when app resumes</a:t>
+            </a:r>
+          </a:p>
+          <a:p>
+            <a:pPr marL="285750" indent="-285750">
+              <a:buFont typeface="Arial" panose="020B0604020202020204" pitchFamily="34" charset="0"/>
+              <a:buChar char="•"/>
+            </a:pPr>
+            <a:r>
+              <a:rPr lang="en-US" sz="2800" dirty="0"/>
+              <a:t>Auto-generate password</a:t>
             </a:r>
           </a:p>
         </p:txBody>
@@ -13641,7 +13736,7 @@
     </p:spTree>
     <p:extLst>
       <p:ext uri="{BB962C8B-B14F-4D97-AF65-F5344CB8AC3E}">
-        <p14:creationId xmlns:p14="http://schemas.microsoft.com/office/powerpoint/2010/main" val="2085557375"/>
+        <p14:creationId xmlns:p14="http://schemas.microsoft.com/office/powerpoint/2010/main" val="1367992137"/>
       </p:ext>
     </p:extLst>
   </p:cSld>
@@ -13696,7 +13791,7 @@
           <a:p>
             <a:r>
               <a:rPr lang="en-US" dirty="0"/>
-              <a:t>Approach</a:t>
+              <a:t>Apple/IOS</a:t>
             </a:r>
           </a:p>
         </p:txBody>
@@ -13735,7 +13830,7 @@
             </a:pPr>
             <a:r>
               <a:rPr lang="en-US" sz="2800" dirty="0"/>
-              <a:t>All components are functional with hooks (first time writing with hooks)</a:t>
+              <a:t>I don’t own a mac or an IOS device, so never tested this on IOS</a:t>
             </a:r>
           </a:p>
           <a:p>
@@ -13745,42 +13840,15 @@
             </a:pPr>
             <a:r>
               <a:rPr lang="en-US" sz="2800" dirty="0"/>
-              <a:t>Used expo managed workflow</a:t>
+              <a:t>Macincloud.com for testing?</a:t>
             </a:r>
-          </a:p>
-          <a:p>
-            <a:pPr marL="914400" lvl="1" indent="-457200">
-              <a:buFont typeface="Arial" panose="020B0604020202020204" pitchFamily="34" charset="0"/>
-              <a:buChar char="•"/>
-            </a:pPr>
-            <a:r>
-              <a:rPr lang="en-US" sz="2600" dirty="0"/>
-              <a:t>Supports building IOS app in cloud</a:t>
-            </a:r>
-          </a:p>
-          <a:p>
-            <a:pPr marL="914400" lvl="1" indent="-457200">
-              <a:buFont typeface="Arial" panose="020B0604020202020204" pitchFamily="34" charset="0"/>
-              <a:buChar char="•"/>
-            </a:pPr>
-            <a:r>
-              <a:rPr lang="en-US" sz="2600" dirty="0"/>
-              <a:t>None of its restrictions were a problem for this app.</a:t>
-            </a:r>
-          </a:p>
-          <a:p>
-            <a:pPr marL="457200" indent="-457200">
-              <a:buFont typeface="Arial" panose="020B0604020202020204" pitchFamily="34" charset="0"/>
-              <a:buChar char="•"/>
-            </a:pPr>
-            <a:endParaRPr lang="en-US" sz="2800" dirty="0"/>
           </a:p>
         </p:txBody>
       </p:sp>
     </p:spTree>
     <p:extLst>
       <p:ext uri="{BB962C8B-B14F-4D97-AF65-F5344CB8AC3E}">
-        <p14:creationId xmlns:p14="http://schemas.microsoft.com/office/powerpoint/2010/main" val="2483586979"/>
+        <p14:creationId xmlns:p14="http://schemas.microsoft.com/office/powerpoint/2010/main" val="2085557375"/>
       </p:ext>
     </p:extLst>
   </p:cSld>
@@ -13835,7 +13903,7 @@
           <a:p>
             <a:r>
               <a:rPr lang="en-US" dirty="0"/>
-              <a:t>Node</a:t>
+              <a:t>Approach</a:t>
             </a:r>
           </a:p>
         </p:txBody>
@@ -13874,15 +13942,17 @@
             </a:pPr>
             <a:r>
               <a:rPr lang="en-US" sz="2800" dirty="0"/>
-              <a:t>New version of node </a:t>
+              <a:t>All components are functional with hooks (first time writing with hooks)</a:t>
             </a:r>
-            <a:r>
-              <a:rPr lang="en-US" sz="2800" dirty="0" err="1"/>
-              <a:t>lts</a:t>
-            </a:r>
+          </a:p>
+          <a:p>
+            <a:pPr marL="457200" indent="-457200">
+              <a:buFont typeface="Arial" panose="020B0604020202020204" pitchFamily="34" charset="0"/>
+              <a:buChar char="•"/>
+            </a:pPr>
             <a:r>
               <a:rPr lang="en-US" sz="2800" dirty="0"/>
-              <a:t> released recently. React Native doesn’t seem to work with it</a:t>
+              <a:t>Used expo managed workflow</a:t>
             </a:r>
           </a:p>
           <a:p>
@@ -13892,25 +13962,7 @@
             </a:pPr>
             <a:r>
               <a:rPr lang="en-US" sz="2600" dirty="0"/>
-              <a:t>States some error about regular expressions. Didn’t spend much time debugging.</a:t>
-            </a:r>
-          </a:p>
-          <a:p>
-            <a:pPr marL="457200" indent="-457200">
-              <a:buFont typeface="Arial" panose="020B0604020202020204" pitchFamily="34" charset="0"/>
-              <a:buChar char="•"/>
-            </a:pPr>
-            <a:r>
-              <a:rPr lang="en-US" sz="2800" dirty="0"/>
-              <a:t>Used old </a:t>
-            </a:r>
-            <a:r>
-              <a:rPr lang="en-US" sz="2800" dirty="0" err="1"/>
-              <a:t>lts</a:t>
-            </a:r>
-            <a:r>
-              <a:rPr lang="en-US" sz="2800" dirty="0"/>
-              <a:t> version (10.17.0)</a:t>
+              <a:t>Supports building IOS app in cloud</a:t>
             </a:r>
           </a:p>
           <a:p>
@@ -13919,8 +13971,8 @@
               <a:buChar char="•"/>
             </a:pPr>
             <a:r>
-              <a:rPr lang="en-US" sz="2400" dirty="0"/>
-              <a:t>Worked fine out of the box</a:t>
+              <a:rPr lang="en-US" sz="2600" dirty="0"/>
+              <a:t>None of its restrictions were a problem for this app.</a:t>
             </a:r>
           </a:p>
           <a:p>
@@ -13935,7 +13987,7 @@
     </p:spTree>
     <p:extLst>
       <p:ext uri="{BB962C8B-B14F-4D97-AF65-F5344CB8AC3E}">
-        <p14:creationId xmlns:p14="http://schemas.microsoft.com/office/powerpoint/2010/main" val="2243917595"/>
+        <p14:creationId xmlns:p14="http://schemas.microsoft.com/office/powerpoint/2010/main" val="2483586979"/>
       </p:ext>
     </p:extLst>
   </p:cSld>
@@ -13980,7 +14032,7 @@
         </p:nvSpPr>
         <p:spPr>
           <a:xfrm>
-            <a:off x="1035686" y="2850535"/>
+            <a:off x="1154955" y="751381"/>
             <a:ext cx="8825658" cy="971402"/>
           </a:xfrm>
         </p:spPr>
@@ -13990,15 +14042,107 @@
           <a:p>
             <a:r>
               <a:rPr lang="en-US" dirty="0"/>
-              <a:t>App Demo</a:t>
+              <a:t>Node</a:t>
             </a:r>
+          </a:p>
+        </p:txBody>
+      </p:sp>
+      <p:sp>
+        <p:nvSpPr>
+          <p:cNvPr id="4" name="Subtitle 3">
+            <a:extLst>
+              <a:ext uri="{FF2B5EF4-FFF2-40B4-BE49-F238E27FC236}">
+                <a16:creationId xmlns:a16="http://schemas.microsoft.com/office/drawing/2014/main" id="{F3E837E5-DA39-4532-958A-18A5C8CDD8D5}"/>
+              </a:ext>
+            </a:extLst>
+          </p:cNvPr>
+          <p:cNvSpPr>
+            <a:spLocks noGrp="1"/>
+          </p:cNvSpPr>
+          <p:nvPr>
+            <p:ph type="subTitle" idx="1"/>
+          </p:nvPr>
+        </p:nvSpPr>
+        <p:spPr>
+          <a:xfrm>
+            <a:off x="1154955" y="1722783"/>
+            <a:ext cx="8825658" cy="3916017"/>
+          </a:xfrm>
+        </p:spPr>
+        <p:txBody>
+          <a:bodyPr>
+            <a:normAutofit/>
+          </a:bodyPr>
+          <a:lstStyle/>
+          <a:p>
+            <a:pPr marL="457200" indent="-457200">
+              <a:buFont typeface="Arial" panose="020B0604020202020204" pitchFamily="34" charset="0"/>
+              <a:buChar char="•"/>
+            </a:pPr>
+            <a:r>
+              <a:rPr lang="en-US" sz="2800" dirty="0"/>
+              <a:t>New version of node </a:t>
+            </a:r>
+            <a:r>
+              <a:rPr lang="en-US" sz="2800" dirty="0" err="1"/>
+              <a:t>lts</a:t>
+            </a:r>
+            <a:r>
+              <a:rPr lang="en-US" sz="2800" dirty="0"/>
+              <a:t> released recently. React Native doesn’t seem to work with it</a:t>
+            </a:r>
+          </a:p>
+          <a:p>
+            <a:pPr marL="914400" lvl="1" indent="-457200">
+              <a:buFont typeface="Arial" panose="020B0604020202020204" pitchFamily="34" charset="0"/>
+              <a:buChar char="•"/>
+            </a:pPr>
+            <a:r>
+              <a:rPr lang="en-US" sz="2600" dirty="0"/>
+              <a:t>States some error about regular expressions. Didn’t spend much time debugging.</a:t>
+            </a:r>
+          </a:p>
+          <a:p>
+            <a:pPr marL="457200" indent="-457200">
+              <a:buFont typeface="Arial" panose="020B0604020202020204" pitchFamily="34" charset="0"/>
+              <a:buChar char="•"/>
+            </a:pPr>
+            <a:r>
+              <a:rPr lang="en-US" sz="2800" dirty="0"/>
+              <a:t>Used old </a:t>
+            </a:r>
+            <a:r>
+              <a:rPr lang="en-US" sz="2800" dirty="0" err="1"/>
+              <a:t>lts</a:t>
+            </a:r>
+            <a:r>
+              <a:rPr lang="en-US" sz="2800" dirty="0"/>
+              <a:t> version (10.17.0)</a:t>
+            </a:r>
+          </a:p>
+          <a:p>
+            <a:pPr marL="914400" lvl="1" indent="-457200">
+              <a:buFont typeface="Arial" panose="020B0604020202020204" pitchFamily="34" charset="0"/>
+              <a:buChar char="•"/>
+            </a:pPr>
+            <a:r>
+              <a:rPr lang="en-US" sz="2400" dirty="0"/>
+              <a:t>Worked fine out of the box</a:t>
+            </a:r>
+          </a:p>
+          <a:p>
+            <a:pPr marL="457200" indent="-457200">
+              <a:buFont typeface="Arial" panose="020B0604020202020204" pitchFamily="34" charset="0"/>
+              <a:buChar char="•"/>
+            </a:pPr>
+            <a:endParaRPr lang="en-US" sz="2800" dirty="0"/>
           </a:p>
         </p:txBody>
       </p:sp>
     </p:spTree>
     <p:extLst>
       <p:ext uri="{BB962C8B-B14F-4D97-AF65-F5344CB8AC3E}">
-        <p14:creationId xmlns:p14="http://schemas.microsoft.com/office/powerpoint/2010/main" val="1374427339"/>
+        <p14:creationId xmlns:p14="http://schemas.microsoft.com/office/powerpoint/2010/main" val="2243917595"/>
       </p:ext>
     </p:extLst>
   </p:cSld>
@@ -14043,8 +14187,8 @@
         </p:nvSpPr>
         <p:spPr>
           <a:xfrm>
-            <a:off x="1154954" y="751381"/>
-            <a:ext cx="9022715" cy="971402"/>
+            <a:off x="1035686" y="2850535"/>
+            <a:ext cx="8825658" cy="971402"/>
           </a:xfrm>
         </p:spPr>
         <p:txBody>
@@ -14053,120 +14197,15 @@
           <a:p>
             <a:r>
               <a:rPr lang="en-US" dirty="0"/>
-              <a:t>Comparisons with Xamarin</a:t>
+              <a:t>App Demo</a:t>
             </a:r>
-          </a:p>
-        </p:txBody>
-      </p:sp>
-      <p:sp>
-        <p:nvSpPr>
-          <p:cNvPr id="4" name="Subtitle 3">
-            <a:extLst>
-              <a:ext uri="{FF2B5EF4-FFF2-40B4-BE49-F238E27FC236}">
-                <a16:creationId xmlns:a16="http://schemas.microsoft.com/office/drawing/2014/main" id="{F3E837E5-DA39-4532-958A-18A5C8CDD8D5}"/>
-              </a:ext>
-            </a:extLst>
-          </p:cNvPr>
-          <p:cNvSpPr>
-            <a:spLocks noGrp="1"/>
-          </p:cNvSpPr>
-          <p:nvPr>
-            <p:ph type="subTitle" idx="1"/>
-          </p:nvPr>
-        </p:nvSpPr>
-        <p:spPr>
-          <a:xfrm>
-            <a:off x="1154955" y="1722783"/>
-            <a:ext cx="8825658" cy="3916017"/>
-          </a:xfrm>
-        </p:spPr>
-        <p:txBody>
-          <a:bodyPr>
-            <a:normAutofit lnSpcReduction="10000"/>
-          </a:bodyPr>
-          <a:lstStyle/>
-          <a:p>
-            <a:pPr marL="285750" indent="-285750">
-              <a:buFont typeface="Arial" panose="020B0604020202020204" pitchFamily="34" charset="0"/>
-              <a:buChar char="•"/>
-            </a:pPr>
-            <a:r>
-              <a:rPr lang="en-US" sz="2800" dirty="0"/>
-              <a:t>Xamarin is older/handles windows universal</a:t>
-            </a:r>
-          </a:p>
-          <a:p>
-            <a:pPr marL="285750" indent="-285750">
-              <a:buFont typeface="Arial" panose="020B0604020202020204" pitchFamily="34" charset="0"/>
-              <a:buChar char="•"/>
-            </a:pPr>
-            <a:r>
-              <a:rPr lang="en-US" sz="2800" dirty="0"/>
-              <a:t>C# stricter language. Better debug info?</a:t>
-            </a:r>
-          </a:p>
-          <a:p>
-            <a:pPr marL="285750" indent="-285750">
-              <a:buFont typeface="Arial" panose="020B0604020202020204" pitchFamily="34" charset="0"/>
-              <a:buChar char="•"/>
-            </a:pPr>
-            <a:r>
-              <a:rPr lang="en-US" sz="2800" dirty="0"/>
-              <a:t>ORM built into the language</a:t>
-            </a:r>
-          </a:p>
-          <a:p>
-            <a:pPr marL="285750" indent="-285750">
-              <a:buFont typeface="Arial" panose="020B0604020202020204" pitchFamily="34" charset="0"/>
-              <a:buChar char="•"/>
-            </a:pPr>
-            <a:r>
-              <a:rPr lang="en-US" sz="2800" dirty="0"/>
-              <a:t>Layouts can be tested without running app</a:t>
-            </a:r>
-          </a:p>
-          <a:p>
-            <a:pPr marL="285750" indent="-285750">
-              <a:buFont typeface="Arial" panose="020B0604020202020204" pitchFamily="34" charset="0"/>
-              <a:buChar char="•"/>
-            </a:pPr>
-            <a:r>
-              <a:rPr lang="en-US" sz="2800" dirty="0"/>
-              <a:t>Must explicitly state where to put </a:t>
-            </a:r>
-            <a:r>
-              <a:rPr lang="en-US" sz="2800" dirty="0" err="1"/>
-              <a:t>sqlite</a:t>
-            </a:r>
-            <a:r>
-              <a:rPr lang="en-US" sz="2800" dirty="0"/>
-              <a:t> database file and it’s a different path for android vs. </a:t>
-            </a:r>
-            <a:r>
-              <a:rPr lang="en-US" sz="2800" dirty="0" err="1"/>
-              <a:t>ios</a:t>
-            </a:r>
-            <a:r>
-              <a:rPr lang="en-US" sz="2800" dirty="0"/>
-              <a:t>.</a:t>
-            </a:r>
-          </a:p>
-          <a:p>
-            <a:pPr marL="285750" indent="-285750">
-              <a:buFont typeface="Arial" panose="020B0604020202020204" pitchFamily="34" charset="0"/>
-              <a:buChar char="•"/>
-            </a:pPr>
-            <a:endParaRPr lang="en-US" sz="2800" dirty="0"/>
-          </a:p>
-          <a:p>
-            <a:endParaRPr lang="en-US" sz="2800" dirty="0"/>
           </a:p>
         </p:txBody>
       </p:sp>
     </p:spTree>
     <p:extLst>
       <p:ext uri="{BB962C8B-B14F-4D97-AF65-F5344CB8AC3E}">
-        <p14:creationId xmlns:p14="http://schemas.microsoft.com/office/powerpoint/2010/main" val="1012910816"/>
+        <p14:creationId xmlns:p14="http://schemas.microsoft.com/office/powerpoint/2010/main" val="1374427339"/>
       </p:ext>
     </p:extLst>
   </p:cSld>
@@ -14211,7 +14250,7 @@
         </p:nvSpPr>
         <p:spPr>
           <a:xfrm>
-            <a:off x="1154954" y="2951243"/>
+            <a:off x="1154954" y="751381"/>
             <a:ext cx="9022715" cy="971402"/>
           </a:xfrm>
         </p:spPr>
@@ -14221,15 +14260,120 @@
           <a:p>
             <a:r>
               <a:rPr lang="en-US" dirty="0"/>
-              <a:t>Questions?</a:t>
+              <a:t>Comparisons with Xamarin</a:t>
             </a:r>
+          </a:p>
+        </p:txBody>
+      </p:sp>
+      <p:sp>
+        <p:nvSpPr>
+          <p:cNvPr id="4" name="Subtitle 3">
+            <a:extLst>
+              <a:ext uri="{FF2B5EF4-FFF2-40B4-BE49-F238E27FC236}">
+                <a16:creationId xmlns:a16="http://schemas.microsoft.com/office/drawing/2014/main" id="{F3E837E5-DA39-4532-958A-18A5C8CDD8D5}"/>
+              </a:ext>
+            </a:extLst>
+          </p:cNvPr>
+          <p:cNvSpPr>
+            <a:spLocks noGrp="1"/>
+          </p:cNvSpPr>
+          <p:nvPr>
+            <p:ph type="subTitle" idx="1"/>
+          </p:nvPr>
+        </p:nvSpPr>
+        <p:spPr>
+          <a:xfrm>
+            <a:off x="1154955" y="1722783"/>
+            <a:ext cx="8825658" cy="3916017"/>
+          </a:xfrm>
+        </p:spPr>
+        <p:txBody>
+          <a:bodyPr>
+            <a:normAutofit lnSpcReduction="10000"/>
+          </a:bodyPr>
+          <a:lstStyle/>
+          <a:p>
+            <a:pPr marL="285750" indent="-285750">
+              <a:buFont typeface="Arial" panose="020B0604020202020204" pitchFamily="34" charset="0"/>
+              <a:buChar char="•"/>
+            </a:pPr>
+            <a:r>
+              <a:rPr lang="en-US" sz="2800" dirty="0"/>
+              <a:t>Xamarin is older/handles windows universal</a:t>
+            </a:r>
+          </a:p>
+          <a:p>
+            <a:pPr marL="285750" indent="-285750">
+              <a:buFont typeface="Arial" panose="020B0604020202020204" pitchFamily="34" charset="0"/>
+              <a:buChar char="•"/>
+            </a:pPr>
+            <a:r>
+              <a:rPr lang="en-US" sz="2800" dirty="0"/>
+              <a:t>C# stricter language. Better debug info?</a:t>
+            </a:r>
+          </a:p>
+          <a:p>
+            <a:pPr marL="285750" indent="-285750">
+              <a:buFont typeface="Arial" panose="020B0604020202020204" pitchFamily="34" charset="0"/>
+              <a:buChar char="•"/>
+            </a:pPr>
+            <a:r>
+              <a:rPr lang="en-US" sz="2800" dirty="0"/>
+              <a:t>ORM built into the language</a:t>
+            </a:r>
+          </a:p>
+          <a:p>
+            <a:pPr marL="285750" indent="-285750">
+              <a:buFont typeface="Arial" panose="020B0604020202020204" pitchFamily="34" charset="0"/>
+              <a:buChar char="•"/>
+            </a:pPr>
+            <a:r>
+              <a:rPr lang="en-US" sz="2800" dirty="0"/>
+              <a:t>Layouts can be tested without running app</a:t>
+            </a:r>
+          </a:p>
+          <a:p>
+            <a:pPr marL="285750" indent="-285750">
+              <a:buFont typeface="Arial" panose="020B0604020202020204" pitchFamily="34" charset="0"/>
+              <a:buChar char="•"/>
+            </a:pPr>
+            <a:r>
+              <a:rPr lang="en-US" sz="2800" dirty="0"/>
+              <a:t>Must explicitly state where to put </a:t>
+            </a:r>
+            <a:r>
+              <a:rPr lang="en-US" sz="2800" dirty="0" err="1"/>
+              <a:t>sqlite</a:t>
+            </a:r>
+            <a:r>
+              <a:rPr lang="en-US" sz="2800" dirty="0"/>
+              <a:t> database file and it’s a different path for android vs. </a:t>
+            </a:r>
+            <a:r>
+              <a:rPr lang="en-US" sz="2800" dirty="0" err="1"/>
+              <a:t>ios</a:t>
+            </a:r>
+            <a:r>
+              <a:rPr lang="en-US" sz="2800" dirty="0"/>
+              <a:t>.</a:t>
+            </a:r>
+          </a:p>
+          <a:p>
+            <a:pPr marL="285750" indent="-285750">
+              <a:buFont typeface="Arial" panose="020B0604020202020204" pitchFamily="34" charset="0"/>
+              <a:buChar char="•"/>
+            </a:pPr>
+            <a:endParaRPr lang="en-US" sz="2800" dirty="0"/>
+          </a:p>
+          <a:p>
+            <a:endParaRPr lang="en-US" sz="2800" dirty="0"/>
           </a:p>
         </p:txBody>
       </p:sp>
     </p:spTree>
     <p:extLst>
       <p:ext uri="{BB962C8B-B14F-4D97-AF65-F5344CB8AC3E}">
-        <p14:creationId xmlns:p14="http://schemas.microsoft.com/office/powerpoint/2010/main" val="241024147"/>
+        <p14:creationId xmlns:p14="http://schemas.microsoft.com/office/powerpoint/2010/main" val="1012910816"/>
       </p:ext>
     </p:extLst>
   </p:cSld>

</xml_diff>